<commit_message>
Update apresentacao slides 2
</commit_message>
<xml_diff>
--- a/Apresentacao Groovy.pptx
+++ b/Apresentacao Groovy.pptx
@@ -12,7 +12,9 @@
     <p:sldId id="262" r:id="rId6"/>
     <p:sldId id="263" r:id="rId7"/>
     <p:sldId id="264" r:id="rId8"/>
-    <p:sldId id="259" r:id="rId9"/>
+    <p:sldId id="266" r:id="rId9"/>
+    <p:sldId id="265" r:id="rId10"/>
+    <p:sldId id="259" r:id="rId11"/>
   </p:sldIdLst>
   <p:sldSz cx="12192000" cy="6858000"/>
   <p:notesSz cx="6858000" cy="9144000"/>
@@ -111,6 +113,11 @@
       </a:defRPr>
     </a:lvl9pPr>
   </p:defaultTextStyle>
+  <p:extLst>
+    <p:ext uri="{EFAFB233-063F-42B5-8137-9DF3F51BA10A}">
+      <p15:sldGuideLst xmlns:p15="http://schemas.microsoft.com/office/powerpoint/2012/main"/>
+    </p:ext>
+  </p:extLst>
 </p:presentation>
 </file>
 
@@ -6293,6 +6300,313 @@
 </p:sld>
 </file>
 
+<file path=ppt/slides/slide10.xml><?xml version="1.0" encoding="utf-8"?>
+<p:sld xmlns:a="http://schemas.openxmlformats.org/drawingml/2006/main" xmlns:r="http://schemas.openxmlformats.org/officeDocument/2006/relationships" xmlns:p="http://schemas.openxmlformats.org/presentationml/2006/main">
+  <p:cSld>
+    <p:spTree>
+      <p:nvGrpSpPr>
+        <p:cNvPr id="1" name=""/>
+        <p:cNvGrpSpPr/>
+        <p:nvPr/>
+      </p:nvGrpSpPr>
+      <p:grpSpPr>
+        <a:xfrm>
+          <a:off x="0" y="0"/>
+          <a:ext cx="0" cy="0"/>
+          <a:chOff x="0" y="0"/>
+          <a:chExt cx="0" cy="0"/>
+        </a:xfrm>
+      </p:grpSpPr>
+      <p:sp>
+        <p:nvSpPr>
+          <p:cNvPr id="2" name="Título 1"/>
+          <p:cNvSpPr>
+            <a:spLocks noGrp="1"/>
+          </p:cNvSpPr>
+          <p:nvPr>
+            <p:ph type="title"/>
+          </p:nvPr>
+        </p:nvSpPr>
+        <p:spPr>
+          <a:xfrm>
+            <a:off x="1484310" y="0"/>
+            <a:ext cx="10018713" cy="1752599"/>
+          </a:xfrm>
+        </p:spPr>
+        <p:txBody>
+          <a:bodyPr/>
+          <a:lstStyle/>
+          <a:p>
+            <a:r>
+              <a:rPr lang="pt-BR" dirty="0" smtClean="0"/>
+              <a:t>Referências</a:t>
+            </a:r>
+            <a:endParaRPr lang="pt-BR" dirty="0"/>
+          </a:p>
+        </p:txBody>
+      </p:sp>
+      <p:sp>
+        <p:nvSpPr>
+          <p:cNvPr id="3" name="Espaço Reservado para Conteúdo 2"/>
+          <p:cNvSpPr>
+            <a:spLocks noGrp="1"/>
+          </p:cNvSpPr>
+          <p:nvPr>
+            <p:ph idx="1"/>
+          </p:nvPr>
+        </p:nvSpPr>
+        <p:spPr>
+          <a:xfrm>
+            <a:off x="1484310" y="1752599"/>
+            <a:ext cx="10018713" cy="5105401"/>
+          </a:xfrm>
+        </p:spPr>
+        <p:txBody>
+          <a:bodyPr>
+            <a:normAutofit/>
+          </a:bodyPr>
+          <a:lstStyle/>
+          <a:p>
+            <a:r>
+              <a:rPr lang="pt-BR" sz="2000" b="1" dirty="0" smtClean="0"/>
+              <a:t>[1]</a:t>
+            </a:r>
+            <a:r>
+              <a:rPr lang="pt-BR" sz="2000" dirty="0" smtClean="0"/>
+              <a:t>  </a:t>
+            </a:r>
+            <a:r>
+              <a:rPr lang="pt-BR" sz="2000" dirty="0" err="1" smtClean="0"/>
+              <a:t>Groovy</a:t>
+            </a:r>
+            <a:r>
+              <a:rPr lang="pt-BR" sz="2000" dirty="0" smtClean="0"/>
+              <a:t>-Lang</a:t>
+            </a:r>
+          </a:p>
+          <a:p>
+            <a:pPr lvl="1"/>
+            <a:r>
+              <a:rPr lang="pt-BR" sz="1400" dirty="0" smtClean="0">
+                <a:hlinkClick r:id="rId2" action="ppaction://hlinkfile"/>
+              </a:rPr>
+              <a:t>groovy-lang.org</a:t>
+            </a:r>
+            <a:endParaRPr lang="pt-BR" sz="1400" dirty="0" smtClean="0"/>
+          </a:p>
+          <a:p>
+            <a:r>
+              <a:rPr lang="pt-BR" sz="2000" b="1" dirty="0" smtClean="0"/>
+              <a:t>[2]</a:t>
+            </a:r>
+            <a:r>
+              <a:rPr lang="pt-BR" sz="2000" dirty="0" smtClean="0"/>
+              <a:t>  </a:t>
+            </a:r>
+            <a:r>
+              <a:rPr lang="pt-BR" sz="2000" dirty="0" err="1" smtClean="0"/>
+              <a:t>Wikipedia</a:t>
+            </a:r>
+            <a:endParaRPr lang="pt-BR" sz="2000" dirty="0" smtClean="0"/>
+          </a:p>
+          <a:p>
+            <a:pPr lvl="1"/>
+            <a:r>
+              <a:rPr lang="pt-BR" sz="1400" dirty="0" smtClean="0">
+                <a:hlinkClick r:id="rId3" action="ppaction://hlinkfile"/>
+              </a:rPr>
+              <a:t>pt.wikipedia.org/</a:t>
+            </a:r>
+            <a:r>
+              <a:rPr lang="pt-BR" sz="1400" dirty="0" err="1" smtClean="0">
+                <a:hlinkClick r:id="rId3" action="ppaction://hlinkfile"/>
+              </a:rPr>
+              <a:t>wiki</a:t>
+            </a:r>
+            <a:r>
+              <a:rPr lang="pt-BR" sz="1400" dirty="0" smtClean="0">
+                <a:hlinkClick r:id="rId3" action="ppaction://hlinkfile"/>
+              </a:rPr>
+              <a:t>/</a:t>
+            </a:r>
+            <a:r>
+              <a:rPr lang="pt-BR" sz="1400" dirty="0" err="1" smtClean="0">
+                <a:hlinkClick r:id="rId3" action="ppaction://hlinkfile"/>
+              </a:rPr>
+              <a:t>Groovy</a:t>
+            </a:r>
+            <a:endParaRPr lang="pt-BR" sz="1400" dirty="0" smtClean="0"/>
+          </a:p>
+          <a:p>
+            <a:r>
+              <a:rPr lang="pt-BR" sz="2000" b="1" dirty="0" smtClean="0"/>
+              <a:t>[3]</a:t>
+            </a:r>
+            <a:r>
+              <a:rPr lang="pt-BR" sz="2000" dirty="0" smtClean="0"/>
+              <a:t>  </a:t>
+            </a:r>
+            <a:r>
+              <a:rPr lang="pt-BR" sz="2000" dirty="0" err="1" smtClean="0"/>
+              <a:t>DevMedia</a:t>
+            </a:r>
+            <a:r>
+              <a:rPr lang="pt-BR" sz="2000" dirty="0" smtClean="0"/>
+              <a:t>: Artigo sobre </a:t>
+            </a:r>
+            <a:r>
+              <a:rPr lang="pt-BR" sz="2000" dirty="0" err="1" smtClean="0"/>
+              <a:t>Groovy</a:t>
+            </a:r>
+            <a:endParaRPr lang="pt-BR" sz="2000" dirty="0" smtClean="0"/>
+          </a:p>
+          <a:p>
+            <a:pPr lvl="1"/>
+            <a:r>
+              <a:rPr lang="pt-BR" sz="1400" dirty="0" smtClean="0">
+                <a:hlinkClick r:id="rId4" action="ppaction://hlinkfile"/>
+              </a:rPr>
+              <a:t>devmedia.com.br/artigo-java-magazine-69-um-pouco-de-groovy/12874</a:t>
+            </a:r>
+            <a:endParaRPr lang="pt-BR" sz="1600" dirty="0" smtClean="0"/>
+          </a:p>
+          <a:p>
+            <a:r>
+              <a:rPr lang="pt-BR" sz="2000" b="1" dirty="0" smtClean="0"/>
+              <a:t>[4]</a:t>
+            </a:r>
+            <a:r>
+              <a:rPr lang="pt-BR" sz="2000" dirty="0" smtClean="0"/>
+              <a:t>  </a:t>
+            </a:r>
+            <a:r>
+              <a:rPr lang="pt-BR" sz="2000" dirty="0" err="1" smtClean="0"/>
+              <a:t>Groovy</a:t>
+            </a:r>
+            <a:r>
+              <a:rPr lang="pt-BR" sz="2000" dirty="0" smtClean="0"/>
+              <a:t>-Lang </a:t>
+            </a:r>
+            <a:r>
+              <a:rPr lang="pt-BR" sz="2000" dirty="0" err="1" smtClean="0"/>
+              <a:t>Documentation</a:t>
+            </a:r>
+            <a:endParaRPr lang="pt-BR" sz="2000" dirty="0" smtClean="0"/>
+          </a:p>
+          <a:p>
+            <a:pPr lvl="1"/>
+            <a:r>
+              <a:rPr lang="pt-BR" sz="1400" dirty="0" smtClean="0">
+                <a:hlinkClick r:id="rId5" action="ppaction://hlinkfile"/>
+              </a:rPr>
+              <a:t>docs.groovy-lang.org/</a:t>
+            </a:r>
+            <a:r>
+              <a:rPr lang="pt-BR" sz="1400" dirty="0" err="1" smtClean="0">
+                <a:hlinkClick r:id="rId5" action="ppaction://hlinkfile"/>
+              </a:rPr>
+              <a:t>docs</a:t>
+            </a:r>
+            <a:r>
+              <a:rPr lang="pt-BR" sz="1400" dirty="0" smtClean="0">
+                <a:hlinkClick r:id="rId5" action="ppaction://hlinkfile"/>
+              </a:rPr>
+              <a:t>/groovy-2.5.3/</a:t>
+            </a:r>
+            <a:r>
+              <a:rPr lang="pt-BR" sz="1400" dirty="0" err="1" smtClean="0">
+                <a:hlinkClick r:id="rId5" action="ppaction://hlinkfile"/>
+              </a:rPr>
+              <a:t>html</a:t>
+            </a:r>
+            <a:r>
+              <a:rPr lang="pt-BR" sz="1400" dirty="0" smtClean="0">
+                <a:hlinkClick r:id="rId5" action="ppaction://hlinkfile"/>
+              </a:rPr>
+              <a:t>/</a:t>
+            </a:r>
+            <a:r>
+              <a:rPr lang="pt-BR" sz="1400" dirty="0" err="1" smtClean="0">
+                <a:hlinkClick r:id="rId5" action="ppaction://hlinkfile"/>
+              </a:rPr>
+              <a:t>documentation</a:t>
+            </a:r>
+            <a:r>
+              <a:rPr lang="pt-BR" sz="1400" dirty="0" smtClean="0">
+                <a:hlinkClick r:id="rId5" action="ppaction://hlinkfile"/>
+              </a:rPr>
+              <a:t>/</a:t>
+            </a:r>
+            <a:endParaRPr lang="pt-BR" sz="1400" dirty="0" smtClean="0"/>
+          </a:p>
+          <a:p>
+            <a:r>
+              <a:rPr lang="pt-BR" sz="2000" b="1" dirty="0" smtClean="0"/>
+              <a:t>[</a:t>
+            </a:r>
+            <a:r>
+              <a:rPr lang="pt-BR" sz="2000" b="1" dirty="0"/>
+              <a:t>5]</a:t>
+            </a:r>
+            <a:r>
+              <a:rPr lang="pt-BR" sz="2000" dirty="0"/>
+              <a:t> </a:t>
+            </a:r>
+            <a:r>
+              <a:rPr lang="pt-BR" sz="2000" dirty="0" smtClean="0"/>
+              <a:t> Linguagens </a:t>
+            </a:r>
+            <a:r>
+              <a:rPr lang="pt-BR" sz="2000" dirty="0"/>
+              <a:t>de </a:t>
+            </a:r>
+            <a:r>
+              <a:rPr lang="pt-BR" sz="2000" dirty="0" smtClean="0"/>
+              <a:t>Programação </a:t>
+            </a:r>
+            <a:r>
+              <a:rPr lang="pt-BR" sz="2000" dirty="0" err="1" smtClean="0"/>
+              <a:t>Groovy</a:t>
+            </a:r>
+            <a:endParaRPr lang="pt-BR" sz="2000" dirty="0" smtClean="0"/>
+          </a:p>
+          <a:p>
+            <a:pPr lvl="1"/>
+            <a:r>
+              <a:rPr lang="pt-BR" sz="1600" dirty="0" smtClean="0">
+                <a:hlinkClick r:id="rId6" action="ppaction://hlinkfile"/>
+              </a:rPr>
+              <a:t>inf.ufes.br</a:t>
+            </a:r>
+            <a:r>
+              <a:rPr lang="pt-BR" sz="1600" dirty="0">
+                <a:hlinkClick r:id="rId6" action="ppaction://hlinkfile"/>
+              </a:rPr>
+              <a:t>/~vitorsouza/archive/2020/wp-content/uploads/teaching-lp-20182-seminario-groovy.pdf</a:t>
+            </a:r>
+            <a:endParaRPr lang="pt-BR" sz="1600" dirty="0" smtClean="0"/>
+          </a:p>
+          <a:p>
+            <a:pPr marL="914400" lvl="2" indent="0">
+              <a:buNone/>
+            </a:pPr>
+            <a:endParaRPr lang="pt-BR" sz="1400" dirty="0" smtClean="0"/>
+          </a:p>
+        </p:txBody>
+      </p:sp>
+    </p:spTree>
+    <p:extLst>
+      <p:ext uri="{BB962C8B-B14F-4D97-AF65-F5344CB8AC3E}">
+        <p14:creationId xmlns:p14="http://schemas.microsoft.com/office/powerpoint/2010/main" val="3007793926"/>
+      </p:ext>
+    </p:extLst>
+  </p:cSld>
+  <p:clrMapOvr>
+    <a:masterClrMapping/>
+  </p:clrMapOvr>
+</p:sld>
+</file>
+
 <file path=ppt/slides/slide2.xml><?xml version="1.0" encoding="utf-8"?>
 <p:sld xmlns:a="http://schemas.openxmlformats.org/drawingml/2006/main" xmlns:r="http://schemas.openxmlformats.org/officeDocument/2006/relationships" xmlns:p="http://schemas.openxmlformats.org/presentationml/2006/main">
   <p:cSld>
@@ -7114,7 +7428,7 @@
         </p:nvSpPr>
         <p:spPr>
           <a:xfrm>
-            <a:off x="1484310" y="1752599"/>
+            <a:off x="1484310" y="1752598"/>
             <a:ext cx="10018713" cy="5105401"/>
           </a:xfrm>
         </p:spPr>
@@ -7129,9 +7443,6 @@
               <a:rPr lang="pt-BR" sz="2000" dirty="0" smtClean="0"/>
               <a:t>Orientada a objetos:</a:t>
             </a:r>
-          </a:p>
-          <a:p>
-            <a:pPr lvl="1" algn="just"/>
             <a:endParaRPr lang="pt-BR" sz="1600" dirty="0" smtClean="0"/>
           </a:p>
           <a:p>
@@ -7169,10 +7480,6 @@
             </a:r>
           </a:p>
           <a:p>
-            <a:pPr lvl="1" algn="just"/>
-            <a:endParaRPr lang="pt-BR" sz="1400" dirty="0" smtClean="0"/>
-          </a:p>
-          <a:p>
             <a:pPr algn="just"/>
             <a:r>
               <a:rPr lang="pt-BR" sz="2000" dirty="0" err="1" smtClean="0"/>
@@ -7186,16 +7493,12 @@
           <a:p>
             <a:pPr lvl="1" algn="just"/>
             <a:r>
-              <a:rPr lang="pt-BR" sz="1400" dirty="0" err="1" smtClean="0"/>
+              <a:rPr lang="pt-BR" sz="1400" dirty="0" err="1"/>
               <a:t>Closures</a:t>
             </a:r>
             <a:r>
-              <a:rPr lang="pt-BR" sz="1400" dirty="0" smtClean="0"/>
-              <a:t> </a:t>
-            </a:r>
-            <a:r>
               <a:rPr lang="pt-BR" sz="1400" dirty="0"/>
-              <a:t>nada mais são do que pedaços de código tratados como objetos, e como tal podem receber parâmetros e retornar valores. E como a JVM não sabe se o código que está rodando é </a:t>
+              <a:t> nada mais são do que pedaços de código tratados como objetos, e como tal podem receber parâmetros e retornar valores. E como a JVM não sabe se o código que está rodando é </a:t>
             </a:r>
             <a:r>
               <a:rPr lang="pt-BR" sz="1400" dirty="0" err="1"/>
@@ -7226,26 +7529,48 @@
               <a:t>Integer</a:t>
             </a:r>
             <a:r>
-              <a:rPr lang="pt-BR" sz="1400" dirty="0" smtClean="0"/>
+              <a:rPr lang="pt-BR" sz="1400" dirty="0"/>
               <a:t>.</a:t>
             </a:r>
             <a:endParaRPr lang="pt-BR" sz="1600" dirty="0" smtClean="0"/>
           </a:p>
           <a:p>
-            <a:pPr marL="457200" lvl="1" indent="0" algn="just">
-              <a:buNone/>
-            </a:pPr>
-            <a:endParaRPr lang="pt-BR" sz="1600" dirty="0" smtClean="0"/>
-          </a:p>
-          <a:p>
-            <a:pPr marL="0" indent="0" algn="just">
-              <a:buNone/>
-            </a:pPr>
-            <a:endParaRPr lang="pt-BR" sz="2000" dirty="0"/>
+            <a:pPr algn="just"/>
+            <a:r>
+              <a:rPr lang="pt-BR" sz="2000" dirty="0"/>
+              <a:t>Sintaxe nativa para listas, </a:t>
+            </a:r>
+            <a:r>
+              <a:rPr lang="pt-BR" sz="2000" dirty="0" err="1"/>
+              <a:t>arrays</a:t>
+            </a:r>
+            <a:r>
+              <a:rPr lang="pt-BR" sz="2000" dirty="0"/>
+              <a:t> associativos, vetores, e expressões </a:t>
+            </a:r>
+            <a:r>
+              <a:rPr lang="pt-BR" sz="2000" dirty="0" smtClean="0"/>
+              <a:t>regulares;</a:t>
+            </a:r>
+          </a:p>
+          <a:p>
+            <a:pPr algn="just"/>
+            <a:r>
+              <a:rPr lang="pt-BR" sz="2000" dirty="0"/>
+              <a:t>Sobrecarga de </a:t>
+            </a:r>
+            <a:r>
+              <a:rPr lang="pt-BR" sz="2000" dirty="0" smtClean="0"/>
+              <a:t>operadores;</a:t>
+            </a:r>
           </a:p>
           <a:p>
             <a:pPr algn="just"/>
             <a:endParaRPr lang="pt-BR" sz="2000" dirty="0"/>
+          </a:p>
+          <a:p>
+            <a:pPr algn="just"/>
+            <a:endParaRPr lang="pt-BR" sz="1600" dirty="0" smtClean="0"/>
           </a:p>
         </p:txBody>
       </p:sp>
@@ -7353,48 +7678,6 @@
               <a:rPr lang="pt-BR" sz="1400" dirty="0" smtClean="0"/>
               <a:t>.</a:t>
             </a:r>
-          </a:p>
-          <a:p>
-            <a:pPr lvl="1" algn="just"/>
-            <a:endParaRPr lang="pt-BR" sz="1600" dirty="0" smtClean="0"/>
-          </a:p>
-          <a:p>
-            <a:pPr algn="just"/>
-            <a:r>
-              <a:rPr lang="pt-BR" sz="2000" dirty="0"/>
-              <a:t>Sintaxe nativa para listas, </a:t>
-            </a:r>
-            <a:r>
-              <a:rPr lang="pt-BR" sz="2000" dirty="0" err="1"/>
-              <a:t>arrays</a:t>
-            </a:r>
-            <a:r>
-              <a:rPr lang="pt-BR" sz="2000" dirty="0"/>
-              <a:t> associativos, vetores, e expressões </a:t>
-            </a:r>
-            <a:r>
-              <a:rPr lang="pt-BR" sz="2000" dirty="0" smtClean="0"/>
-              <a:t>regulares</a:t>
-            </a:r>
-            <a:endParaRPr lang="pt-BR" sz="2000" dirty="0"/>
-          </a:p>
-          <a:p>
-            <a:pPr algn="just"/>
-            <a:endParaRPr lang="pt-BR" sz="1400" dirty="0" smtClean="0"/>
-          </a:p>
-          <a:p>
-            <a:pPr algn="just"/>
-            <a:r>
-              <a:rPr lang="pt-BR" sz="2000" dirty="0"/>
-              <a:t>Sobrecarga de </a:t>
-            </a:r>
-            <a:r>
-              <a:rPr lang="pt-BR" sz="2000" dirty="0" smtClean="0"/>
-              <a:t>operadores</a:t>
-            </a:r>
-          </a:p>
-          <a:p>
-            <a:pPr algn="just"/>
             <a:endParaRPr lang="pt-BR" sz="2000" dirty="0"/>
           </a:p>
           <a:p>
@@ -7424,9 +7707,27 @@
             </a:r>
             <a:r>
               <a:rPr lang="pt-BR" sz="1400" dirty="0"/>
-              <a:t>, mas o contrario não é verdade. A GDK estende a JDK adicionando métodos que não existem originalmente nos objetos Java.</a:t>
-            </a:r>
-            <a:endParaRPr lang="pt-BR" sz="1600" dirty="0" smtClean="0"/>
+              <a:t>, mas o contrario não é verdade. A GDK estende a JDK adicionando métodos que não existem originalmente nos objetos Java</a:t>
+            </a:r>
+            <a:r>
+              <a:rPr lang="pt-BR" sz="1400" dirty="0" smtClean="0"/>
+              <a:t>.</a:t>
+            </a:r>
+            <a:endParaRPr lang="pt-BR" sz="2000" dirty="0"/>
+          </a:p>
+          <a:p>
+            <a:pPr algn="just"/>
+            <a:r>
+              <a:rPr lang="pt-BR" sz="2000" dirty="0" smtClean="0"/>
+              <a:t>Escopo dinâmico;</a:t>
+            </a:r>
+          </a:p>
+          <a:p>
+            <a:pPr algn="just"/>
+            <a:r>
+              <a:rPr lang="pt-BR" sz="2000" dirty="0" smtClean="0"/>
+              <a:t>Possui características em comum com Java, já que é inspirada nela;</a:t>
+            </a:r>
           </a:p>
           <a:p>
             <a:pPr marL="457200" lvl="1" indent="0" algn="just">
@@ -7488,6 +7789,83 @@
         </p:nvSpPr>
         <p:spPr>
           <a:xfrm>
+            <a:off x="1484309" y="0"/>
+            <a:ext cx="10018713" cy="1752599"/>
+          </a:xfrm>
+        </p:spPr>
+        <p:txBody>
+          <a:bodyPr/>
+          <a:lstStyle/>
+          <a:p>
+            <a:r>
+              <a:rPr lang="pt-BR" dirty="0" smtClean="0"/>
+              <a:t>Particularidades</a:t>
+            </a:r>
+            <a:endParaRPr lang="pt-BR" dirty="0"/>
+          </a:p>
+        </p:txBody>
+      </p:sp>
+      <p:sp>
+        <p:nvSpPr>
+          <p:cNvPr id="3" name="Espaço Reservado para Conteúdo 2"/>
+          <p:cNvSpPr>
+            <a:spLocks noGrp="1"/>
+          </p:cNvSpPr>
+          <p:nvPr>
+            <p:ph idx="1"/>
+          </p:nvPr>
+        </p:nvSpPr>
+        <p:spPr/>
+        <p:txBody>
+          <a:bodyPr/>
+          <a:lstStyle/>
+          <a:p>
+            <a:endParaRPr lang="pt-BR"/>
+          </a:p>
+        </p:txBody>
+      </p:sp>
+    </p:spTree>
+    <p:extLst>
+      <p:ext uri="{BB962C8B-B14F-4D97-AF65-F5344CB8AC3E}">
+        <p14:creationId xmlns:p14="http://schemas.microsoft.com/office/powerpoint/2010/main" val="2186883364"/>
+      </p:ext>
+    </p:extLst>
+  </p:cSld>
+  <p:clrMapOvr>
+    <a:masterClrMapping/>
+  </p:clrMapOvr>
+</p:sld>
+</file>
+
+<file path=ppt/slides/slide9.xml><?xml version="1.0" encoding="utf-8"?>
+<p:sld xmlns:a="http://schemas.openxmlformats.org/drawingml/2006/main" xmlns:r="http://schemas.openxmlformats.org/officeDocument/2006/relationships" xmlns:p="http://schemas.openxmlformats.org/presentationml/2006/main">
+  <p:cSld>
+    <p:spTree>
+      <p:nvGrpSpPr>
+        <p:cNvPr id="1" name=""/>
+        <p:cNvGrpSpPr/>
+        <p:nvPr/>
+      </p:nvGrpSpPr>
+      <p:grpSpPr>
+        <a:xfrm>
+          <a:off x="0" y="0"/>
+          <a:ext cx="0" cy="0"/>
+          <a:chOff x="0" y="0"/>
+          <a:chExt cx="0" cy="0"/>
+        </a:xfrm>
+      </p:grpSpPr>
+      <p:sp>
+        <p:nvSpPr>
+          <p:cNvPr id="2" name="Título 1"/>
+          <p:cNvSpPr>
+            <a:spLocks noGrp="1"/>
+          </p:cNvSpPr>
+          <p:nvPr>
+            <p:ph type="title"/>
+          </p:nvPr>
+        </p:nvSpPr>
+        <p:spPr>
+          <a:xfrm>
             <a:off x="1484310" y="0"/>
             <a:ext cx="10018713" cy="1752599"/>
           </a:xfrm>
@@ -7498,7 +7876,7 @@
           <a:p>
             <a:r>
               <a:rPr lang="pt-BR" dirty="0" smtClean="0"/>
-              <a:t>Referências</a:t>
+              <a:t>Exemplos</a:t>
             </a:r>
             <a:endParaRPr lang="pt-BR" dirty="0"/>
           </a:p>
@@ -7514,249 +7892,19 @@
             <p:ph idx="1"/>
           </p:nvPr>
         </p:nvSpPr>
-        <p:spPr>
-          <a:xfrm>
-            <a:off x="1484310" y="1752599"/>
-            <a:ext cx="10018713" cy="5105401"/>
-          </a:xfrm>
-        </p:spPr>
-        <p:txBody>
-          <a:bodyPr>
-            <a:normAutofit/>
-          </a:bodyPr>
+        <p:spPr/>
+        <p:txBody>
+          <a:bodyPr/>
           <a:lstStyle/>
           <a:p>
-            <a:r>
-              <a:rPr lang="pt-BR" sz="2000" b="1" dirty="0" smtClean="0"/>
-              <a:t>[1]</a:t>
-            </a:r>
-            <a:r>
-              <a:rPr lang="pt-BR" sz="2000" dirty="0" smtClean="0"/>
-              <a:t>  </a:t>
-            </a:r>
-            <a:r>
-              <a:rPr lang="pt-BR" sz="2000" dirty="0" err="1" smtClean="0"/>
-              <a:t>Groovy</a:t>
-            </a:r>
-            <a:r>
-              <a:rPr lang="pt-BR" sz="2000" dirty="0" smtClean="0"/>
-              <a:t>-Lang</a:t>
-            </a:r>
-          </a:p>
-          <a:p>
-            <a:pPr lvl="1"/>
-            <a:r>
-              <a:rPr lang="pt-BR" sz="1400" dirty="0" smtClean="0">
-                <a:hlinkClick r:id="rId2" action="ppaction://hlinkfile"/>
-              </a:rPr>
-              <a:t>groovy-lang.org</a:t>
-            </a:r>
-            <a:endParaRPr lang="pt-BR" sz="1400" dirty="0" smtClean="0"/>
-          </a:p>
-          <a:p>
-            <a:r>
-              <a:rPr lang="pt-BR" sz="2000" b="1" dirty="0" smtClean="0"/>
-              <a:t>[2]</a:t>
-            </a:r>
-            <a:r>
-              <a:rPr lang="pt-BR" sz="2000" dirty="0" smtClean="0"/>
-              <a:t>  </a:t>
-            </a:r>
-            <a:r>
-              <a:rPr lang="pt-BR" sz="2000" dirty="0" err="1" smtClean="0"/>
-              <a:t>Wikipedia</a:t>
-            </a:r>
-            <a:endParaRPr lang="pt-BR" sz="2000" dirty="0" smtClean="0"/>
-          </a:p>
-          <a:p>
-            <a:pPr lvl="1"/>
-            <a:r>
-              <a:rPr lang="pt-BR" sz="1400" dirty="0" smtClean="0">
-                <a:hlinkClick r:id="rId3" action="ppaction://hlinkfile"/>
-              </a:rPr>
-              <a:t>pt.wikipedia.org/</a:t>
-            </a:r>
-            <a:r>
-              <a:rPr lang="pt-BR" sz="1400" dirty="0" err="1" smtClean="0">
-                <a:hlinkClick r:id="rId3" action="ppaction://hlinkfile"/>
-              </a:rPr>
-              <a:t>wiki</a:t>
-            </a:r>
-            <a:r>
-              <a:rPr lang="pt-BR" sz="1400" dirty="0" smtClean="0">
-                <a:hlinkClick r:id="rId3" action="ppaction://hlinkfile"/>
-              </a:rPr>
-              <a:t>/</a:t>
-            </a:r>
-            <a:r>
-              <a:rPr lang="pt-BR" sz="1400" dirty="0" err="1" smtClean="0">
-                <a:hlinkClick r:id="rId3" action="ppaction://hlinkfile"/>
-              </a:rPr>
-              <a:t>Groovy</a:t>
-            </a:r>
-            <a:endParaRPr lang="pt-BR" sz="1400" dirty="0" smtClean="0"/>
-          </a:p>
-          <a:p>
-            <a:r>
-              <a:rPr lang="pt-BR" sz="2000" b="1" dirty="0" smtClean="0"/>
-              <a:t>[3]</a:t>
-            </a:r>
-            <a:r>
-              <a:rPr lang="pt-BR" sz="2000" dirty="0" smtClean="0"/>
-              <a:t>  </a:t>
-            </a:r>
-            <a:r>
-              <a:rPr lang="pt-BR" sz="2000" dirty="0" err="1" smtClean="0"/>
-              <a:t>DevMedia</a:t>
-            </a:r>
-            <a:r>
-              <a:rPr lang="pt-BR" sz="2000" dirty="0" smtClean="0"/>
-              <a:t>: Artigo sobre </a:t>
-            </a:r>
-            <a:r>
-              <a:rPr lang="pt-BR" sz="2000" dirty="0" err="1" smtClean="0"/>
-              <a:t>Groovy</a:t>
-            </a:r>
-            <a:endParaRPr lang="pt-BR" sz="2000" dirty="0" smtClean="0"/>
-          </a:p>
-          <a:p>
-            <a:pPr lvl="1"/>
-            <a:r>
-              <a:rPr lang="pt-BR" sz="1400" dirty="0" smtClean="0">
-                <a:hlinkClick r:id="rId4" action="ppaction://hlinkfile"/>
-              </a:rPr>
-              <a:t>devmedia.com.br/artigo-java-magazine-69-um-pouco-de-groovy/12874</a:t>
-            </a:r>
-            <a:endParaRPr lang="pt-BR" sz="1600" dirty="0" smtClean="0"/>
-          </a:p>
-          <a:p>
-            <a:r>
-              <a:rPr lang="pt-BR" sz="2000" b="1" dirty="0" smtClean="0"/>
-              <a:t>[4]</a:t>
-            </a:r>
-            <a:r>
-              <a:rPr lang="pt-BR" sz="2000" dirty="0" smtClean="0"/>
-              <a:t>  </a:t>
-            </a:r>
-            <a:r>
-              <a:rPr lang="pt-BR" sz="2000" dirty="0" err="1" smtClean="0"/>
-              <a:t>Groovy</a:t>
-            </a:r>
-            <a:r>
-              <a:rPr lang="pt-BR" sz="2000" dirty="0" smtClean="0"/>
-              <a:t>-Lang </a:t>
-            </a:r>
-            <a:r>
-              <a:rPr lang="pt-BR" sz="2000" dirty="0" err="1" smtClean="0"/>
-              <a:t>Documentation</a:t>
-            </a:r>
-            <a:endParaRPr lang="pt-BR" sz="2000" dirty="0" smtClean="0"/>
-          </a:p>
-          <a:p>
-            <a:pPr lvl="1"/>
-            <a:r>
-              <a:rPr lang="pt-BR" sz="1400" dirty="0" smtClean="0">
-                <a:hlinkClick r:id="rId5" action="ppaction://hlinkfile"/>
-              </a:rPr>
-              <a:t>docs.groovy-lang.org/</a:t>
-            </a:r>
-            <a:r>
-              <a:rPr lang="pt-BR" sz="1400" dirty="0" err="1" smtClean="0">
-                <a:hlinkClick r:id="rId5" action="ppaction://hlinkfile"/>
-              </a:rPr>
-              <a:t>docs</a:t>
-            </a:r>
-            <a:r>
-              <a:rPr lang="pt-BR" sz="1400" dirty="0" smtClean="0">
-                <a:hlinkClick r:id="rId5" action="ppaction://hlinkfile"/>
-              </a:rPr>
-              <a:t>/groovy-2.5.3/</a:t>
-            </a:r>
-            <a:r>
-              <a:rPr lang="pt-BR" sz="1400" dirty="0" err="1" smtClean="0">
-                <a:hlinkClick r:id="rId5" action="ppaction://hlinkfile"/>
-              </a:rPr>
-              <a:t>html</a:t>
-            </a:r>
-            <a:r>
-              <a:rPr lang="pt-BR" sz="1400" dirty="0" smtClean="0">
-                <a:hlinkClick r:id="rId5" action="ppaction://hlinkfile"/>
-              </a:rPr>
-              <a:t>/</a:t>
-            </a:r>
-            <a:r>
-              <a:rPr lang="pt-BR" sz="1400" dirty="0" err="1" smtClean="0">
-                <a:hlinkClick r:id="rId5" action="ppaction://hlinkfile"/>
-              </a:rPr>
-              <a:t>documentation</a:t>
-            </a:r>
-            <a:r>
-              <a:rPr lang="pt-BR" sz="1400" dirty="0" smtClean="0">
-                <a:hlinkClick r:id="rId5" action="ppaction://hlinkfile"/>
-              </a:rPr>
-              <a:t>/</a:t>
-            </a:r>
-            <a:endParaRPr lang="pt-BR" sz="1400" dirty="0" smtClean="0"/>
-          </a:p>
-          <a:p>
-            <a:r>
-              <a:rPr lang="pt-BR" sz="2000" b="1" dirty="0" smtClean="0"/>
-              <a:t>[</a:t>
-            </a:r>
-            <a:r>
-              <a:rPr lang="pt-BR" sz="2000" b="1" dirty="0"/>
-              <a:t>5]</a:t>
-            </a:r>
-            <a:r>
-              <a:rPr lang="pt-BR" sz="2000" dirty="0"/>
-              <a:t> </a:t>
-            </a:r>
-            <a:r>
-              <a:rPr lang="pt-BR" sz="2000" dirty="0" smtClean="0"/>
-              <a:t> Linguagens </a:t>
-            </a:r>
-            <a:r>
-              <a:rPr lang="pt-BR" sz="2000" dirty="0"/>
-              <a:t>de </a:t>
-            </a:r>
-            <a:r>
-              <a:rPr lang="pt-BR" sz="2000" dirty="0" smtClean="0"/>
-              <a:t>Programação </a:t>
-            </a:r>
-            <a:r>
-              <a:rPr lang="pt-BR" sz="2000" dirty="0" err="1" smtClean="0"/>
-              <a:t>Groovy</a:t>
-            </a:r>
-            <a:endParaRPr lang="pt-BR" sz="2000" dirty="0" smtClean="0"/>
-          </a:p>
-          <a:p>
-            <a:pPr lvl="1"/>
-            <a:r>
-              <a:rPr lang="pt-BR" sz="1600" dirty="0" smtClean="0">
-                <a:hlinkClick r:id="rId6" action="ppaction://hlinkfile"/>
-              </a:rPr>
-              <a:t>inf.ufes.br</a:t>
-            </a:r>
-            <a:r>
-              <a:rPr lang="pt-BR" sz="1600" dirty="0">
-                <a:hlinkClick r:id="rId6" action="ppaction://hlinkfile"/>
-              </a:rPr>
-              <a:t>/~vitorsouza/archive/2020/wp-content/uploads/teaching-lp-20182-seminario-groovy.pdf</a:t>
-            </a:r>
-            <a:endParaRPr lang="pt-BR" sz="1600" dirty="0" smtClean="0"/>
-          </a:p>
-          <a:p>
-            <a:pPr marL="914400" lvl="2" indent="0">
-              <a:buNone/>
-            </a:pPr>
-            <a:endParaRPr lang="pt-BR" sz="1400" dirty="0" smtClean="0"/>
+            <a:endParaRPr lang="pt-BR"/>
           </a:p>
         </p:txBody>
       </p:sp>
     </p:spTree>
     <p:extLst>
       <p:ext uri="{BB962C8B-B14F-4D97-AF65-F5344CB8AC3E}">
-        <p14:creationId xmlns:p14="http://schemas.microsoft.com/office/powerpoint/2010/main" val="3007793926"/>
+        <p14:creationId xmlns:p14="http://schemas.microsoft.com/office/powerpoint/2010/main" val="3460207986"/>
       </p:ext>
     </p:extLst>
   </p:cSld>

</xml_diff>